<commit_message>
- Added Automation Action AddLabelsToCardAction - Added Automation Action AddMembersToCardAction - Added Automation Action RemoveMembersFromCardAction - Added the Webhook Object to the WebhookNotification (Trello recently exposed this feature) - Added MoveCardToListAsync for greater discoverability how to do it (was already possible via UpdateCardAsync) Tweaked various documentation for spelling errors
</commit_message>
<xml_diff>
--- a/Docs/Wiki-Images.pptx
+++ b/Docs/Wiki-Images.pptx
@@ -6,6 +6,7 @@
   </p:sldMasterIdLst>
   <p:sldIdLst>
     <p:sldId id="256" r:id="rId2"/>
+    <p:sldId id="257" r:id="rId3"/>
   </p:sldIdLst>
   <p:sldSz cx="12192000" cy="6858000"/>
   <p:notesSz cx="6858000" cy="9144000"/>
@@ -104,6 +105,11 @@
       </a:defRPr>
     </a:lvl9pPr>
   </p:defaultTextStyle>
+  <p:extLst>
+    <p:ext uri="{EFAFB233-063F-42B5-8137-9DF3F51BA10A}">
+      <p15:sldGuideLst xmlns:p15="http://schemas.microsoft.com/office/powerpoint/2012/main"/>
+    </p:ext>
+  </p:extLst>
 </p:presentation>
 </file>
 
@@ -256,7 +262,7 @@
           <a:p>
             <a:fld id="{913C181E-159F-4FBE-BAAC-6069682E1478}" type="datetimeFigureOut">
               <a:rPr lang="en-DK" smtClean="0"/>
-              <a:t>31/05/2023</a:t>
+              <a:t>04/06/2023</a:t>
             </a:fld>
             <a:endParaRPr lang="en-DK"/>
           </a:p>
@@ -456,7 +462,7 @@
           <a:p>
             <a:fld id="{913C181E-159F-4FBE-BAAC-6069682E1478}" type="datetimeFigureOut">
               <a:rPr lang="en-DK" smtClean="0"/>
-              <a:t>31/05/2023</a:t>
+              <a:t>04/06/2023</a:t>
             </a:fld>
             <a:endParaRPr lang="en-DK"/>
           </a:p>
@@ -666,7 +672,7 @@
           <a:p>
             <a:fld id="{913C181E-159F-4FBE-BAAC-6069682E1478}" type="datetimeFigureOut">
               <a:rPr lang="en-DK" smtClean="0"/>
-              <a:t>31/05/2023</a:t>
+              <a:t>04/06/2023</a:t>
             </a:fld>
             <a:endParaRPr lang="en-DK"/>
           </a:p>
@@ -866,7 +872,7 @@
           <a:p>
             <a:fld id="{913C181E-159F-4FBE-BAAC-6069682E1478}" type="datetimeFigureOut">
               <a:rPr lang="en-DK" smtClean="0"/>
-              <a:t>31/05/2023</a:t>
+              <a:t>04/06/2023</a:t>
             </a:fld>
             <a:endParaRPr lang="en-DK"/>
           </a:p>
@@ -1142,7 +1148,7 @@
           <a:p>
             <a:fld id="{913C181E-159F-4FBE-BAAC-6069682E1478}" type="datetimeFigureOut">
               <a:rPr lang="en-DK" smtClean="0"/>
-              <a:t>31/05/2023</a:t>
+              <a:t>04/06/2023</a:t>
             </a:fld>
             <a:endParaRPr lang="en-DK"/>
           </a:p>
@@ -1410,7 +1416,7 @@
           <a:p>
             <a:fld id="{913C181E-159F-4FBE-BAAC-6069682E1478}" type="datetimeFigureOut">
               <a:rPr lang="en-DK" smtClean="0"/>
-              <a:t>31/05/2023</a:t>
+              <a:t>04/06/2023</a:t>
             </a:fld>
             <a:endParaRPr lang="en-DK"/>
           </a:p>
@@ -1825,7 +1831,7 @@
           <a:p>
             <a:fld id="{913C181E-159F-4FBE-BAAC-6069682E1478}" type="datetimeFigureOut">
               <a:rPr lang="en-DK" smtClean="0"/>
-              <a:t>31/05/2023</a:t>
+              <a:t>04/06/2023</a:t>
             </a:fld>
             <a:endParaRPr lang="en-DK"/>
           </a:p>
@@ -1967,7 +1973,7 @@
           <a:p>
             <a:fld id="{913C181E-159F-4FBE-BAAC-6069682E1478}" type="datetimeFigureOut">
               <a:rPr lang="en-DK" smtClean="0"/>
-              <a:t>31/05/2023</a:t>
+              <a:t>04/06/2023</a:t>
             </a:fld>
             <a:endParaRPr lang="en-DK"/>
           </a:p>
@@ -2080,7 +2086,7 @@
           <a:p>
             <a:fld id="{913C181E-159F-4FBE-BAAC-6069682E1478}" type="datetimeFigureOut">
               <a:rPr lang="en-DK" smtClean="0"/>
-              <a:t>31/05/2023</a:t>
+              <a:t>04/06/2023</a:t>
             </a:fld>
             <a:endParaRPr lang="en-DK"/>
           </a:p>
@@ -2393,7 +2399,7 @@
           <a:p>
             <a:fld id="{913C181E-159F-4FBE-BAAC-6069682E1478}" type="datetimeFigureOut">
               <a:rPr lang="en-DK" smtClean="0"/>
-              <a:t>31/05/2023</a:t>
+              <a:t>04/06/2023</a:t>
             </a:fld>
             <a:endParaRPr lang="en-DK"/>
           </a:p>
@@ -2682,7 +2688,7 @@
           <a:p>
             <a:fld id="{913C181E-159F-4FBE-BAAC-6069682E1478}" type="datetimeFigureOut">
               <a:rPr lang="en-DK" smtClean="0"/>
-              <a:t>31/05/2023</a:t>
+              <a:t>04/06/2023</a:t>
             </a:fld>
             <a:endParaRPr lang="en-DK"/>
           </a:p>
@@ -2925,7 +2931,7 @@
           <a:p>
             <a:fld id="{913C181E-159F-4FBE-BAAC-6069682E1478}" type="datetimeFigureOut">
               <a:rPr lang="en-DK" smtClean="0"/>
-              <a:t>31/05/2023</a:t>
+              <a:t>04/06/2023</a:t>
             </a:fld>
             <a:endParaRPr lang="en-DK"/>
           </a:p>
@@ -4285,6 +4291,957 @@
 </p:sld>
 </file>
 
+<file path=ppt/slides/slide2.xml><?xml version="1.0" encoding="utf-8"?>
+<p:sld xmlns:a="http://schemas.openxmlformats.org/drawingml/2006/main" xmlns:r="http://schemas.openxmlformats.org/officeDocument/2006/relationships" xmlns:p="http://schemas.openxmlformats.org/presentationml/2006/main">
+  <p:cSld>
+    <p:spTree>
+      <p:nvGrpSpPr>
+        <p:cNvPr id="1" name=""/>
+        <p:cNvGrpSpPr/>
+        <p:nvPr/>
+      </p:nvGrpSpPr>
+      <p:grpSpPr>
+        <a:xfrm>
+          <a:off x="0" y="0"/>
+          <a:ext cx="0" cy="0"/>
+          <a:chOff x="0" y="0"/>
+          <a:chExt cx="0" cy="0"/>
+        </a:xfrm>
+      </p:grpSpPr>
+      <p:sp>
+        <p:nvSpPr>
+          <p:cNvPr id="51" name="Rectangle 50">
+            <a:extLst>
+              <a:ext uri="{FF2B5EF4-FFF2-40B4-BE49-F238E27FC236}">
+                <a16:creationId xmlns:a16="http://schemas.microsoft.com/office/drawing/2014/main" id="{045FC00D-7ABE-3D75-1911-A4D0F595FB9D}"/>
+              </a:ext>
+            </a:extLst>
+          </p:cNvPr>
+          <p:cNvSpPr/>
+          <p:nvPr/>
+        </p:nvSpPr>
+        <p:spPr>
+          <a:xfrm>
+            <a:off x="1819275" y="2000250"/>
+            <a:ext cx="9658350" cy="2657475"/>
+          </a:xfrm>
+          <a:prstGeom prst="rect">
+            <a:avLst/>
+          </a:prstGeom>
+          <a:solidFill>
+            <a:schemeClr val="bg1">
+              <a:lumMod val="95000"/>
+            </a:schemeClr>
+          </a:solidFill>
+        </p:spPr>
+        <p:style>
+          <a:lnRef idx="2">
+            <a:schemeClr val="accent1">
+              <a:shade val="50000"/>
+            </a:schemeClr>
+          </a:lnRef>
+          <a:fillRef idx="1">
+            <a:schemeClr val="accent1"/>
+          </a:fillRef>
+          <a:effectRef idx="0">
+            <a:schemeClr val="accent1"/>
+          </a:effectRef>
+          <a:fontRef idx="minor">
+            <a:schemeClr val="lt1"/>
+          </a:fontRef>
+        </p:style>
+        <p:txBody>
+          <a:bodyPr rtlCol="0" anchor="ctr"/>
+          <a:lstStyle/>
+          <a:p>
+            <a:pPr algn="ctr"/>
+            <a:endParaRPr lang="en-DK"/>
+          </a:p>
+        </p:txBody>
+      </p:sp>
+      <p:sp>
+        <p:nvSpPr>
+          <p:cNvPr id="4" name="Rectangle 3">
+            <a:extLst>
+              <a:ext uri="{FF2B5EF4-FFF2-40B4-BE49-F238E27FC236}">
+                <a16:creationId xmlns:a16="http://schemas.microsoft.com/office/drawing/2014/main" id="{9E02519C-8808-97BC-C3F7-78B9DF911B2F}"/>
+              </a:ext>
+            </a:extLst>
+          </p:cNvPr>
+          <p:cNvSpPr/>
+          <p:nvPr/>
+        </p:nvSpPr>
+        <p:spPr>
+          <a:xfrm>
+            <a:off x="4095262" y="2133600"/>
+            <a:ext cx="1134469" cy="1850857"/>
+          </a:xfrm>
+          <a:prstGeom prst="rect">
+            <a:avLst/>
+          </a:prstGeom>
+        </p:spPr>
+        <p:style>
+          <a:lnRef idx="2">
+            <a:schemeClr val="accent1">
+              <a:shade val="50000"/>
+            </a:schemeClr>
+          </a:lnRef>
+          <a:fillRef idx="1">
+            <a:schemeClr val="accent1"/>
+          </a:fillRef>
+          <a:effectRef idx="0">
+            <a:schemeClr val="accent1"/>
+          </a:effectRef>
+          <a:fontRef idx="minor">
+            <a:schemeClr val="lt1"/>
+          </a:fontRef>
+        </p:style>
+        <p:txBody>
+          <a:bodyPr rtlCol="0" anchor="ctr"/>
+          <a:lstStyle/>
+          <a:p>
+            <a:pPr algn="ctr"/>
+            <a:r>
+              <a:rPr lang="en-US" dirty="0"/>
+              <a:t>Trello</a:t>
+            </a:r>
+            <a:endParaRPr lang="en-DK" dirty="0"/>
+          </a:p>
+        </p:txBody>
+      </p:sp>
+      <p:sp>
+        <p:nvSpPr>
+          <p:cNvPr id="5" name="Rectangle 4">
+            <a:extLst>
+              <a:ext uri="{FF2B5EF4-FFF2-40B4-BE49-F238E27FC236}">
+                <a16:creationId xmlns:a16="http://schemas.microsoft.com/office/drawing/2014/main" id="{2194A5E9-FB95-1352-E1C0-DCAE6D6D38CF}"/>
+              </a:ext>
+            </a:extLst>
+          </p:cNvPr>
+          <p:cNvSpPr/>
+          <p:nvPr/>
+        </p:nvSpPr>
+        <p:spPr>
+          <a:xfrm>
+            <a:off x="6533153" y="2546684"/>
+            <a:ext cx="1660358" cy="1493922"/>
+          </a:xfrm>
+          <a:prstGeom prst="rect">
+            <a:avLst/>
+          </a:prstGeom>
+        </p:spPr>
+        <p:style>
+          <a:lnRef idx="2">
+            <a:schemeClr val="accent1">
+              <a:shade val="50000"/>
+            </a:schemeClr>
+          </a:lnRef>
+          <a:fillRef idx="1">
+            <a:schemeClr val="accent1"/>
+          </a:fillRef>
+          <a:effectRef idx="0">
+            <a:schemeClr val="accent1"/>
+          </a:effectRef>
+          <a:fontRef idx="minor">
+            <a:schemeClr val="lt1"/>
+          </a:fontRef>
+        </p:style>
+        <p:txBody>
+          <a:bodyPr rtlCol="0" anchor="ctr"/>
+          <a:lstStyle/>
+          <a:p>
+            <a:pPr algn="ctr"/>
+            <a:r>
+              <a:rPr lang="en-US" sz="1400" dirty="0"/>
+              <a:t>Webhook Receiver</a:t>
+            </a:r>
+          </a:p>
+          <a:p>
+            <a:pPr algn="ctr"/>
+            <a:r>
+              <a:rPr lang="en-US" sz="1100" dirty="0"/>
+              <a:t>(HTTPS URL)</a:t>
+            </a:r>
+            <a:endParaRPr lang="en-DK" sz="1100" dirty="0"/>
+          </a:p>
+        </p:txBody>
+      </p:sp>
+      <p:sp>
+        <p:nvSpPr>
+          <p:cNvPr id="6" name="Rectangle 5">
+            <a:extLst>
+              <a:ext uri="{FF2B5EF4-FFF2-40B4-BE49-F238E27FC236}">
+                <a16:creationId xmlns:a16="http://schemas.microsoft.com/office/drawing/2014/main" id="{ADBC3B60-15FF-4BF0-6A71-15654E3042A4}"/>
+              </a:ext>
+            </a:extLst>
+          </p:cNvPr>
+          <p:cNvSpPr/>
+          <p:nvPr/>
+        </p:nvSpPr>
+        <p:spPr>
+          <a:xfrm>
+            <a:off x="1937213" y="2184622"/>
+            <a:ext cx="943985" cy="499263"/>
+          </a:xfrm>
+          <a:prstGeom prst="rect">
+            <a:avLst/>
+          </a:prstGeom>
+        </p:spPr>
+        <p:style>
+          <a:lnRef idx="2">
+            <a:schemeClr val="accent2">
+              <a:shade val="50000"/>
+            </a:schemeClr>
+          </a:lnRef>
+          <a:fillRef idx="1">
+            <a:schemeClr val="accent2"/>
+          </a:fillRef>
+          <a:effectRef idx="0">
+            <a:schemeClr val="accent2"/>
+          </a:effectRef>
+          <a:fontRef idx="minor">
+            <a:schemeClr val="lt1"/>
+          </a:fontRef>
+        </p:style>
+        <p:txBody>
+          <a:bodyPr rtlCol="0" anchor="ctr"/>
+          <a:lstStyle/>
+          <a:p>
+            <a:pPr algn="ctr"/>
+            <a:r>
+              <a:rPr lang="en-US" sz="1200" dirty="0"/>
+              <a:t>Webhook Admin Code</a:t>
+            </a:r>
+            <a:endParaRPr lang="en-DK" sz="1200" dirty="0"/>
+          </a:p>
+        </p:txBody>
+      </p:sp>
+      <p:cxnSp>
+        <p:nvCxnSpPr>
+          <p:cNvPr id="8" name="Straight Arrow Connector 7">
+            <a:extLst>
+              <a:ext uri="{FF2B5EF4-FFF2-40B4-BE49-F238E27FC236}">
+                <a16:creationId xmlns:a16="http://schemas.microsoft.com/office/drawing/2014/main" id="{656F54DE-CA69-97E2-E0A8-436DA3529E72}"/>
+              </a:ext>
+            </a:extLst>
+          </p:cNvPr>
+          <p:cNvCxnSpPr>
+            <a:cxnSpLocks/>
+          </p:cNvCxnSpPr>
+          <p:nvPr/>
+        </p:nvCxnSpPr>
+        <p:spPr>
+          <a:xfrm>
+            <a:off x="2887579" y="2425196"/>
+            <a:ext cx="1207683" cy="12066"/>
+          </a:xfrm>
+          <a:prstGeom prst="straightConnector1">
+            <a:avLst/>
+          </a:prstGeom>
+          <a:ln>
+            <a:tailEnd type="triangle"/>
+          </a:ln>
+        </p:spPr>
+        <p:style>
+          <a:lnRef idx="1">
+            <a:schemeClr val="accent1"/>
+          </a:lnRef>
+          <a:fillRef idx="0">
+            <a:schemeClr val="accent1"/>
+          </a:fillRef>
+          <a:effectRef idx="0">
+            <a:schemeClr val="accent1"/>
+          </a:effectRef>
+          <a:fontRef idx="minor">
+            <a:schemeClr val="tx1"/>
+          </a:fontRef>
+        </p:style>
+      </p:cxnSp>
+      <p:cxnSp>
+        <p:nvCxnSpPr>
+          <p:cNvPr id="12" name="Straight Arrow Connector 11">
+            <a:extLst>
+              <a:ext uri="{FF2B5EF4-FFF2-40B4-BE49-F238E27FC236}">
+                <a16:creationId xmlns:a16="http://schemas.microsoft.com/office/drawing/2014/main" id="{338D7F10-FB71-33F6-9218-2D6F5C20A493}"/>
+              </a:ext>
+            </a:extLst>
+          </p:cNvPr>
+          <p:cNvCxnSpPr/>
+          <p:nvPr/>
+        </p:nvCxnSpPr>
+        <p:spPr>
+          <a:xfrm>
+            <a:off x="5229732" y="2839453"/>
+            <a:ext cx="1275347" cy="0"/>
+          </a:xfrm>
+          <a:prstGeom prst="straightConnector1">
+            <a:avLst/>
+          </a:prstGeom>
+          <a:ln>
+            <a:tailEnd type="triangle"/>
+          </a:ln>
+        </p:spPr>
+        <p:style>
+          <a:lnRef idx="1">
+            <a:schemeClr val="accent1"/>
+          </a:lnRef>
+          <a:fillRef idx="0">
+            <a:schemeClr val="accent1"/>
+          </a:fillRef>
+          <a:effectRef idx="0">
+            <a:schemeClr val="accent1"/>
+          </a:effectRef>
+          <a:fontRef idx="minor">
+            <a:schemeClr val="tx1"/>
+          </a:fontRef>
+        </p:style>
+      </p:cxnSp>
+      <p:cxnSp>
+        <p:nvCxnSpPr>
+          <p:cNvPr id="13" name="Straight Arrow Connector 12">
+            <a:extLst>
+              <a:ext uri="{FF2B5EF4-FFF2-40B4-BE49-F238E27FC236}">
+                <a16:creationId xmlns:a16="http://schemas.microsoft.com/office/drawing/2014/main" id="{B8076193-9759-301D-9146-EB76C249C1CE}"/>
+              </a:ext>
+            </a:extLst>
+          </p:cNvPr>
+          <p:cNvCxnSpPr/>
+          <p:nvPr/>
+        </p:nvCxnSpPr>
+        <p:spPr>
+          <a:xfrm>
+            <a:off x="5229730" y="3412958"/>
+            <a:ext cx="1275347" cy="0"/>
+          </a:xfrm>
+          <a:prstGeom prst="straightConnector1">
+            <a:avLst/>
+          </a:prstGeom>
+          <a:ln>
+            <a:tailEnd type="triangle"/>
+          </a:ln>
+        </p:spPr>
+        <p:style>
+          <a:lnRef idx="1">
+            <a:schemeClr val="accent1"/>
+          </a:lnRef>
+          <a:fillRef idx="0">
+            <a:schemeClr val="accent1"/>
+          </a:fillRef>
+          <a:effectRef idx="0">
+            <a:schemeClr val="accent1"/>
+          </a:effectRef>
+          <a:fontRef idx="minor">
+            <a:schemeClr val="tx1"/>
+          </a:fontRef>
+        </p:style>
+      </p:cxnSp>
+      <p:cxnSp>
+        <p:nvCxnSpPr>
+          <p:cNvPr id="14" name="Straight Arrow Connector 13">
+            <a:extLst>
+              <a:ext uri="{FF2B5EF4-FFF2-40B4-BE49-F238E27FC236}">
+                <a16:creationId xmlns:a16="http://schemas.microsoft.com/office/drawing/2014/main" id="{C58BD6A4-4F7C-4874-9888-288C25EA4383}"/>
+              </a:ext>
+            </a:extLst>
+          </p:cNvPr>
+          <p:cNvCxnSpPr/>
+          <p:nvPr/>
+        </p:nvCxnSpPr>
+        <p:spPr>
+          <a:xfrm>
+            <a:off x="5229731" y="3128210"/>
+            <a:ext cx="1275347" cy="0"/>
+          </a:xfrm>
+          <a:prstGeom prst="straightConnector1">
+            <a:avLst/>
+          </a:prstGeom>
+          <a:ln>
+            <a:tailEnd type="triangle"/>
+          </a:ln>
+        </p:spPr>
+        <p:style>
+          <a:lnRef idx="1">
+            <a:schemeClr val="accent1"/>
+          </a:lnRef>
+          <a:fillRef idx="0">
+            <a:schemeClr val="accent1"/>
+          </a:fillRef>
+          <a:effectRef idx="0">
+            <a:schemeClr val="accent1"/>
+          </a:effectRef>
+          <a:fontRef idx="minor">
+            <a:schemeClr val="tx1"/>
+          </a:fontRef>
+        </p:style>
+      </p:cxnSp>
+      <p:cxnSp>
+        <p:nvCxnSpPr>
+          <p:cNvPr id="15" name="Straight Arrow Connector 14">
+            <a:extLst>
+              <a:ext uri="{FF2B5EF4-FFF2-40B4-BE49-F238E27FC236}">
+                <a16:creationId xmlns:a16="http://schemas.microsoft.com/office/drawing/2014/main" id="{0DA563A7-BFF5-1205-16C8-432F1E9020F5}"/>
+              </a:ext>
+            </a:extLst>
+          </p:cNvPr>
+          <p:cNvCxnSpPr/>
+          <p:nvPr/>
+        </p:nvCxnSpPr>
+        <p:spPr>
+          <a:xfrm>
+            <a:off x="5229734" y="3711741"/>
+            <a:ext cx="1275347" cy="0"/>
+          </a:xfrm>
+          <a:prstGeom prst="straightConnector1">
+            <a:avLst/>
+          </a:prstGeom>
+          <a:ln>
+            <a:tailEnd type="triangle"/>
+          </a:ln>
+        </p:spPr>
+        <p:style>
+          <a:lnRef idx="1">
+            <a:schemeClr val="accent1"/>
+          </a:lnRef>
+          <a:fillRef idx="0">
+            <a:schemeClr val="accent1"/>
+          </a:fillRef>
+          <a:effectRef idx="0">
+            <a:schemeClr val="accent1"/>
+          </a:effectRef>
+          <a:fontRef idx="minor">
+            <a:schemeClr val="tx1"/>
+          </a:fontRef>
+        </p:style>
+      </p:cxnSp>
+      <p:sp>
+        <p:nvSpPr>
+          <p:cNvPr id="26" name="TextBox 25">
+            <a:extLst>
+              <a:ext uri="{FF2B5EF4-FFF2-40B4-BE49-F238E27FC236}">
+                <a16:creationId xmlns:a16="http://schemas.microsoft.com/office/drawing/2014/main" id="{C87FB7E8-94E5-4D61-A779-AF48C66D4FF3}"/>
+              </a:ext>
+            </a:extLst>
+          </p:cNvPr>
+          <p:cNvSpPr txBox="1"/>
+          <p:nvPr/>
+        </p:nvSpPr>
+        <p:spPr>
+          <a:xfrm>
+            <a:off x="5545071" y="2561316"/>
+            <a:ext cx="644664" cy="276999"/>
+          </a:xfrm>
+          <a:prstGeom prst="rect">
+            <a:avLst/>
+          </a:prstGeom>
+          <a:noFill/>
+        </p:spPr>
+        <p:txBody>
+          <a:bodyPr wrap="none" rtlCol="0">
+            <a:spAutoFit/>
+          </a:bodyPr>
+          <a:lstStyle/>
+          <a:p>
+            <a:r>
+              <a:rPr lang="en-US" sz="1200" dirty="0"/>
+              <a:t>Event 1</a:t>
+            </a:r>
+            <a:endParaRPr lang="en-DK" sz="1200" dirty="0"/>
+          </a:p>
+        </p:txBody>
+      </p:sp>
+      <p:sp>
+        <p:nvSpPr>
+          <p:cNvPr id="27" name="TextBox 26">
+            <a:extLst>
+              <a:ext uri="{FF2B5EF4-FFF2-40B4-BE49-F238E27FC236}">
+                <a16:creationId xmlns:a16="http://schemas.microsoft.com/office/drawing/2014/main" id="{2666D491-A12B-CDB6-4AAD-646C8B179E2D}"/>
+              </a:ext>
+            </a:extLst>
+          </p:cNvPr>
+          <p:cNvSpPr txBox="1"/>
+          <p:nvPr/>
+        </p:nvSpPr>
+        <p:spPr>
+          <a:xfrm>
+            <a:off x="5545071" y="2885167"/>
+            <a:ext cx="644664" cy="276999"/>
+          </a:xfrm>
+          <a:prstGeom prst="rect">
+            <a:avLst/>
+          </a:prstGeom>
+          <a:noFill/>
+        </p:spPr>
+        <p:txBody>
+          <a:bodyPr wrap="none" rtlCol="0">
+            <a:spAutoFit/>
+          </a:bodyPr>
+          <a:lstStyle/>
+          <a:p>
+            <a:r>
+              <a:rPr lang="en-US" sz="1200" dirty="0"/>
+              <a:t>Event 1</a:t>
+            </a:r>
+            <a:endParaRPr lang="en-DK" sz="1200" dirty="0"/>
+          </a:p>
+        </p:txBody>
+      </p:sp>
+      <p:sp>
+        <p:nvSpPr>
+          <p:cNvPr id="28" name="TextBox 27">
+            <a:extLst>
+              <a:ext uri="{FF2B5EF4-FFF2-40B4-BE49-F238E27FC236}">
+                <a16:creationId xmlns:a16="http://schemas.microsoft.com/office/drawing/2014/main" id="{26D4F388-0C7F-148F-BC09-D937FC40A4A0}"/>
+              </a:ext>
+            </a:extLst>
+          </p:cNvPr>
+          <p:cNvSpPr txBox="1"/>
+          <p:nvPr/>
+        </p:nvSpPr>
+        <p:spPr>
+          <a:xfrm>
+            <a:off x="5545071" y="3458401"/>
+            <a:ext cx="665503" cy="276999"/>
+          </a:xfrm>
+          <a:prstGeom prst="rect">
+            <a:avLst/>
+          </a:prstGeom>
+          <a:noFill/>
+        </p:spPr>
+        <p:txBody>
+          <a:bodyPr wrap="none" rtlCol="0">
+            <a:spAutoFit/>
+          </a:bodyPr>
+          <a:lstStyle/>
+          <a:p>
+            <a:r>
+              <a:rPr lang="en-US" sz="1200" dirty="0"/>
+              <a:t>Event N</a:t>
+            </a:r>
+            <a:endParaRPr lang="en-DK" sz="1200" dirty="0"/>
+          </a:p>
+        </p:txBody>
+      </p:sp>
+      <p:sp>
+        <p:nvSpPr>
+          <p:cNvPr id="29" name="TextBox 28">
+            <a:extLst>
+              <a:ext uri="{FF2B5EF4-FFF2-40B4-BE49-F238E27FC236}">
+                <a16:creationId xmlns:a16="http://schemas.microsoft.com/office/drawing/2014/main" id="{05725455-22AC-0D2A-BF44-919FFE9B715E}"/>
+              </a:ext>
+            </a:extLst>
+          </p:cNvPr>
+          <p:cNvSpPr txBox="1"/>
+          <p:nvPr/>
+        </p:nvSpPr>
+        <p:spPr>
+          <a:xfrm>
+            <a:off x="5717362" y="3135959"/>
+            <a:ext cx="300082" cy="276999"/>
+          </a:xfrm>
+          <a:prstGeom prst="rect">
+            <a:avLst/>
+          </a:prstGeom>
+          <a:noFill/>
+        </p:spPr>
+        <p:txBody>
+          <a:bodyPr wrap="none" rtlCol="0">
+            <a:spAutoFit/>
+          </a:bodyPr>
+          <a:lstStyle/>
+          <a:p>
+            <a:r>
+              <a:rPr lang="en-US" sz="1200" dirty="0"/>
+              <a:t>…</a:t>
+            </a:r>
+            <a:endParaRPr lang="en-DK" sz="1200" dirty="0"/>
+          </a:p>
+        </p:txBody>
+      </p:sp>
+      <p:sp>
+        <p:nvSpPr>
+          <p:cNvPr id="31" name="TextBox 30">
+            <a:extLst>
+              <a:ext uri="{FF2B5EF4-FFF2-40B4-BE49-F238E27FC236}">
+                <a16:creationId xmlns:a16="http://schemas.microsoft.com/office/drawing/2014/main" id="{6725E38A-C23B-63AE-2BB8-443F200DBD35}"/>
+              </a:ext>
+            </a:extLst>
+          </p:cNvPr>
+          <p:cNvSpPr txBox="1"/>
+          <p:nvPr/>
+        </p:nvSpPr>
+        <p:spPr>
+          <a:xfrm>
+            <a:off x="2960793" y="2176305"/>
+            <a:ext cx="1071897" cy="276999"/>
+          </a:xfrm>
+          <a:prstGeom prst="rect">
+            <a:avLst/>
+          </a:prstGeom>
+          <a:noFill/>
+        </p:spPr>
+        <p:txBody>
+          <a:bodyPr wrap="none" rtlCol="0">
+            <a:spAutoFit/>
+          </a:bodyPr>
+          <a:lstStyle/>
+          <a:p>
+            <a:r>
+              <a:rPr lang="en-US" sz="1200" dirty="0"/>
+              <a:t>Add Webhook</a:t>
+            </a:r>
+            <a:endParaRPr lang="en-DK" sz="1200" dirty="0"/>
+          </a:p>
+        </p:txBody>
+      </p:sp>
+      <p:sp>
+        <p:nvSpPr>
+          <p:cNvPr id="32" name="Rectangle 31">
+            <a:extLst>
+              <a:ext uri="{FF2B5EF4-FFF2-40B4-BE49-F238E27FC236}">
+                <a16:creationId xmlns:a16="http://schemas.microsoft.com/office/drawing/2014/main" id="{14166E67-964F-86EE-03E8-D76BC1198746}"/>
+              </a:ext>
+            </a:extLst>
+          </p:cNvPr>
+          <p:cNvSpPr/>
+          <p:nvPr/>
+        </p:nvSpPr>
+        <p:spPr>
+          <a:xfrm>
+            <a:off x="8196748" y="2546015"/>
+            <a:ext cx="1660358" cy="1493922"/>
+          </a:xfrm>
+          <a:prstGeom prst="rect">
+            <a:avLst/>
+          </a:prstGeom>
+        </p:spPr>
+        <p:style>
+          <a:lnRef idx="2">
+            <a:schemeClr val="accent2">
+              <a:shade val="50000"/>
+            </a:schemeClr>
+          </a:lnRef>
+          <a:fillRef idx="1">
+            <a:schemeClr val="accent2"/>
+          </a:fillRef>
+          <a:effectRef idx="0">
+            <a:schemeClr val="accent2"/>
+          </a:effectRef>
+          <a:fontRef idx="minor">
+            <a:schemeClr val="lt1"/>
+          </a:fontRef>
+        </p:style>
+        <p:txBody>
+          <a:bodyPr rtlCol="0" anchor="ctr"/>
+          <a:lstStyle/>
+          <a:p>
+            <a:pPr algn="ctr"/>
+            <a:r>
+              <a:rPr lang="en-US" sz="1200" dirty="0"/>
+              <a:t>Tool to Turn </a:t>
+            </a:r>
+          </a:p>
+          <a:p>
+            <a:pPr algn="ctr"/>
+            <a:r>
+              <a:rPr lang="en-US" sz="1200" dirty="0"/>
+              <a:t>JSON into </a:t>
+            </a:r>
+          </a:p>
+          <a:p>
+            <a:pPr algn="ctr"/>
+            <a:r>
+              <a:rPr lang="en-US" sz="1200" dirty="0"/>
+              <a:t>C# Classes</a:t>
+            </a:r>
+            <a:endParaRPr lang="en-DK" sz="1200" dirty="0"/>
+          </a:p>
+        </p:txBody>
+      </p:sp>
+      <p:sp>
+        <p:nvSpPr>
+          <p:cNvPr id="34" name="TextBox 33">
+            <a:extLst>
+              <a:ext uri="{FF2B5EF4-FFF2-40B4-BE49-F238E27FC236}">
+                <a16:creationId xmlns:a16="http://schemas.microsoft.com/office/drawing/2014/main" id="{A74C7055-53CD-C6CC-3491-76E0D0A8654E}"/>
+              </a:ext>
+            </a:extLst>
+          </p:cNvPr>
+          <p:cNvSpPr txBox="1"/>
+          <p:nvPr/>
+        </p:nvSpPr>
+        <p:spPr>
+          <a:xfrm>
+            <a:off x="6537106" y="3794712"/>
+            <a:ext cx="1697901" cy="253916"/>
+          </a:xfrm>
+          <a:prstGeom prst="rect">
+            <a:avLst/>
+          </a:prstGeom>
+          <a:noFill/>
+        </p:spPr>
+        <p:txBody>
+          <a:bodyPr wrap="none" rtlCol="0">
+            <a:spAutoFit/>
+          </a:bodyPr>
+          <a:lstStyle/>
+          <a:p>
+            <a:r>
+              <a:rPr lang="en-US" sz="1050" dirty="0">
+                <a:solidFill>
+                  <a:schemeClr val="bg1"/>
+                </a:solidFill>
+              </a:rPr>
+              <a:t>Azure Function or other API</a:t>
+            </a:r>
+            <a:endParaRPr lang="en-DK" sz="1050" dirty="0">
+              <a:solidFill>
+                <a:schemeClr val="bg1"/>
+              </a:solidFill>
+            </a:endParaRPr>
+          </a:p>
+        </p:txBody>
+      </p:sp>
+      <p:cxnSp>
+        <p:nvCxnSpPr>
+          <p:cNvPr id="36" name="Connector: Elbow 35">
+            <a:extLst>
+              <a:ext uri="{FF2B5EF4-FFF2-40B4-BE49-F238E27FC236}">
+                <a16:creationId xmlns:a16="http://schemas.microsoft.com/office/drawing/2014/main" id="{583E7188-BA82-1B58-7BDE-2BB6EF262D4C}"/>
+              </a:ext>
+            </a:extLst>
+          </p:cNvPr>
+          <p:cNvCxnSpPr>
+            <a:cxnSpLocks/>
+            <a:stCxn id="32" idx="2"/>
+            <a:endCxn id="4" idx="2"/>
+          </p:cNvCxnSpPr>
+          <p:nvPr/>
+        </p:nvCxnSpPr>
+        <p:spPr>
+          <a:xfrm rot="5400000" flipH="1">
+            <a:off x="6816972" y="1829982"/>
+            <a:ext cx="55480" cy="4364430"/>
+          </a:xfrm>
+          <a:prstGeom prst="bentConnector3">
+            <a:avLst>
+              <a:gd name="adj1" fmla="val -412040"/>
+            </a:avLst>
+          </a:prstGeom>
+          <a:ln>
+            <a:tailEnd type="triangle"/>
+          </a:ln>
+        </p:spPr>
+        <p:style>
+          <a:lnRef idx="1">
+            <a:schemeClr val="accent1"/>
+          </a:lnRef>
+          <a:fillRef idx="0">
+            <a:schemeClr val="accent1"/>
+          </a:fillRef>
+          <a:effectRef idx="0">
+            <a:schemeClr val="accent1"/>
+          </a:effectRef>
+          <a:fontRef idx="minor">
+            <a:schemeClr val="tx1"/>
+          </a:fontRef>
+        </p:style>
+      </p:cxnSp>
+      <p:sp>
+        <p:nvSpPr>
+          <p:cNvPr id="37" name="Rectangle 36">
+            <a:extLst>
+              <a:ext uri="{FF2B5EF4-FFF2-40B4-BE49-F238E27FC236}">
+                <a16:creationId xmlns:a16="http://schemas.microsoft.com/office/drawing/2014/main" id="{364FE6B5-C054-26CB-CFF6-6FFB88E9A6EA}"/>
+              </a:ext>
+            </a:extLst>
+          </p:cNvPr>
+          <p:cNvSpPr/>
+          <p:nvPr/>
+        </p:nvSpPr>
+        <p:spPr>
+          <a:xfrm>
+            <a:off x="10215150" y="3984457"/>
+            <a:ext cx="1174750" cy="558538"/>
+          </a:xfrm>
+          <a:prstGeom prst="rect">
+            <a:avLst/>
+          </a:prstGeom>
+        </p:spPr>
+        <p:style>
+          <a:lnRef idx="2">
+            <a:schemeClr val="accent3">
+              <a:shade val="50000"/>
+            </a:schemeClr>
+          </a:lnRef>
+          <a:fillRef idx="1">
+            <a:schemeClr val="accent3"/>
+          </a:fillRef>
+          <a:effectRef idx="0">
+            <a:schemeClr val="accent3"/>
+          </a:effectRef>
+          <a:fontRef idx="minor">
+            <a:schemeClr val="lt1"/>
+          </a:fontRef>
+        </p:style>
+        <p:txBody>
+          <a:bodyPr rtlCol="0" anchor="ctr"/>
+          <a:lstStyle/>
+          <a:p>
+            <a:pPr algn="ctr"/>
+            <a:r>
+              <a:rPr lang="en-US" sz="1200" dirty="0"/>
+              <a:t>3</a:t>
+            </a:r>
+            <a:r>
+              <a:rPr lang="en-US" sz="1200" baseline="30000" dirty="0"/>
+              <a:t>rd</a:t>
+            </a:r>
+            <a:r>
+              <a:rPr lang="en-US" sz="1200" dirty="0"/>
+              <a:t> Party System</a:t>
+            </a:r>
+            <a:endParaRPr lang="en-DK" sz="1200" dirty="0"/>
+          </a:p>
+        </p:txBody>
+      </p:sp>
+      <p:cxnSp>
+        <p:nvCxnSpPr>
+          <p:cNvPr id="39" name="Connector: Elbow 38">
+            <a:extLst>
+              <a:ext uri="{FF2B5EF4-FFF2-40B4-BE49-F238E27FC236}">
+                <a16:creationId xmlns:a16="http://schemas.microsoft.com/office/drawing/2014/main" id="{CF321A02-2E35-AE9C-65C0-9CFE7ED92493}"/>
+              </a:ext>
+            </a:extLst>
+          </p:cNvPr>
+          <p:cNvCxnSpPr>
+            <a:cxnSpLocks/>
+            <a:stCxn id="32" idx="2"/>
+            <a:endCxn id="37" idx="1"/>
+          </p:cNvCxnSpPr>
+          <p:nvPr/>
+        </p:nvCxnSpPr>
+        <p:spPr>
+          <a:xfrm rot="16200000" flipH="1">
+            <a:off x="9509144" y="3557719"/>
+            <a:ext cx="223789" cy="1188223"/>
+          </a:xfrm>
+          <a:prstGeom prst="bentConnector2">
+            <a:avLst/>
+          </a:prstGeom>
+          <a:ln>
+            <a:tailEnd type="triangle"/>
+          </a:ln>
+        </p:spPr>
+        <p:style>
+          <a:lnRef idx="1">
+            <a:schemeClr val="accent1"/>
+          </a:lnRef>
+          <a:fillRef idx="0">
+            <a:schemeClr val="accent1"/>
+          </a:fillRef>
+          <a:effectRef idx="0">
+            <a:schemeClr val="accent1"/>
+          </a:effectRef>
+          <a:fontRef idx="minor">
+            <a:schemeClr val="tx1"/>
+          </a:fontRef>
+        </p:style>
+      </p:cxnSp>
+      <p:sp>
+        <p:nvSpPr>
+          <p:cNvPr id="50" name="Arrow: Right 49">
+            <a:extLst>
+              <a:ext uri="{FF2B5EF4-FFF2-40B4-BE49-F238E27FC236}">
+                <a16:creationId xmlns:a16="http://schemas.microsoft.com/office/drawing/2014/main" id="{90B46733-67BC-281D-C3BF-8F1C74B8C5FE}"/>
+              </a:ext>
+            </a:extLst>
+          </p:cNvPr>
+          <p:cNvSpPr/>
+          <p:nvPr/>
+        </p:nvSpPr>
+        <p:spPr>
+          <a:xfrm>
+            <a:off x="8042800" y="3175084"/>
+            <a:ext cx="351983" cy="253916"/>
+          </a:xfrm>
+          <a:prstGeom prst="rightArrow">
+            <a:avLst/>
+          </a:prstGeom>
+        </p:spPr>
+        <p:style>
+          <a:lnRef idx="2">
+            <a:schemeClr val="accent6">
+              <a:shade val="50000"/>
+            </a:schemeClr>
+          </a:lnRef>
+          <a:fillRef idx="1">
+            <a:schemeClr val="accent6"/>
+          </a:fillRef>
+          <a:effectRef idx="0">
+            <a:schemeClr val="accent6"/>
+          </a:effectRef>
+          <a:fontRef idx="minor">
+            <a:schemeClr val="lt1"/>
+          </a:fontRef>
+        </p:style>
+        <p:txBody>
+          <a:bodyPr rtlCol="0" anchor="ctr"/>
+          <a:lstStyle/>
+          <a:p>
+            <a:pPr algn="ctr"/>
+            <a:endParaRPr lang="en-DK"/>
+          </a:p>
+        </p:txBody>
+      </p:sp>
+      <p:sp>
+        <p:nvSpPr>
+          <p:cNvPr id="52" name="TextBox 51">
+            <a:extLst>
+              <a:ext uri="{FF2B5EF4-FFF2-40B4-BE49-F238E27FC236}">
+                <a16:creationId xmlns:a16="http://schemas.microsoft.com/office/drawing/2014/main" id="{2D2517C2-1111-78B2-D349-45ACFA6DF9D0}"/>
+              </a:ext>
+            </a:extLst>
+          </p:cNvPr>
+          <p:cNvSpPr txBox="1"/>
+          <p:nvPr/>
+        </p:nvSpPr>
+        <p:spPr>
+          <a:xfrm>
+            <a:off x="8414376" y="1991639"/>
+            <a:ext cx="3023520" cy="369332"/>
+          </a:xfrm>
+          <a:prstGeom prst="rect">
+            <a:avLst/>
+          </a:prstGeom>
+          <a:noFill/>
+        </p:spPr>
+        <p:txBody>
+          <a:bodyPr wrap="none" rtlCol="0">
+            <a:spAutoFit/>
+          </a:bodyPr>
+          <a:lstStyle/>
+          <a:p>
+            <a:r>
+              <a:rPr lang="en-US" dirty="0"/>
+              <a:t>Webhook Data Receiver Setup</a:t>
+            </a:r>
+            <a:endParaRPr lang="en-DK" dirty="0"/>
+          </a:p>
+        </p:txBody>
+      </p:sp>
+    </p:spTree>
+    <p:extLst>
+      <p:ext uri="{BB962C8B-B14F-4D97-AF65-F5344CB8AC3E}">
+        <p14:creationId xmlns:p14="http://schemas.microsoft.com/office/powerpoint/2010/main" val="588410347"/>
+      </p:ext>
+    </p:extLst>
+  </p:cSld>
+  <p:clrMapOvr>
+    <a:masterClrMapping/>
+  </p:clrMapOvr>
+</p:sld>
+</file>
+
 <file path=ppt/theme/theme1.xml><?xml version="1.0" encoding="utf-8"?>
 <a:theme xmlns:a="http://schemas.openxmlformats.org/drawingml/2006/main" name="Office Theme">
   <a:themeElements>

</xml_diff>